<commit_message>
new presentation, better networks images
</commit_message>
<xml_diff>
--- a/presentazione_davide_carniselli.pptx
+++ b/presentazione_davide_carniselli.pptx
@@ -299,7 +299,7 @@
           <a:p>
             <a:fld id="{64F0E216-BA48-4F04-AC4F-645AA0DD6AC6}" type="datetimeFigureOut">
               <a:rPr lang="en-US" smtClean="0"/>
-              <a:t>11/28/2022</a:t>
+              <a:t>11/30/2022</a:t>
             </a:fld>
             <a:endParaRPr lang="en-US" dirty="0"/>
           </a:p>
@@ -1347,7 +1347,7 @@
           <a:p>
             <a:fld id="{64F0E216-BA48-4F04-AC4F-645AA0DD6AC6}" type="datetimeFigureOut">
               <a:rPr lang="en-US" smtClean="0"/>
-              <a:t>11/28/2022</a:t>
+              <a:t>11/30/2022</a:t>
             </a:fld>
             <a:endParaRPr lang="en-US"/>
           </a:p>
@@ -1583,7 +1583,7 @@
           <a:p>
             <a:fld id="{64F0E216-BA48-4F04-AC4F-645AA0DD6AC6}" type="datetimeFigureOut">
               <a:rPr lang="en-US" smtClean="0"/>
-              <a:t>11/28/2022</a:t>
+              <a:t>11/30/2022</a:t>
             </a:fld>
             <a:endParaRPr lang="en-US"/>
           </a:p>
@@ -1806,7 +1806,7 @@
           <a:p>
             <a:fld id="{64F0E216-BA48-4F04-AC4F-645AA0DD6AC6}" type="datetimeFigureOut">
               <a:rPr lang="en-US" smtClean="0"/>
-              <a:t>11/28/2022</a:t>
+              <a:t>11/30/2022</a:t>
             </a:fld>
             <a:endParaRPr lang="en-US"/>
           </a:p>
@@ -2108,7 +2108,7 @@
           <a:p>
             <a:fld id="{64F0E216-BA48-4F04-AC4F-645AA0DD6AC6}" type="datetimeFigureOut">
               <a:rPr lang="en-US" smtClean="0"/>
-              <a:t>11/28/2022</a:t>
+              <a:t>11/30/2022</a:t>
             </a:fld>
             <a:endParaRPr lang="en-US"/>
           </a:p>
@@ -3572,7 +3572,7 @@
           <a:p>
             <a:fld id="{64F0E216-BA48-4F04-AC4F-645AA0DD6AC6}" type="datetimeFigureOut">
               <a:rPr lang="en-US" smtClean="0"/>
-              <a:t>11/28/2022</a:t>
+              <a:t>11/30/2022</a:t>
             </a:fld>
             <a:endParaRPr lang="en-US"/>
           </a:p>
@@ -4039,7 +4039,7 @@
           <a:p>
             <a:fld id="{64F0E216-BA48-4F04-AC4F-645AA0DD6AC6}" type="datetimeFigureOut">
               <a:rPr lang="en-US" smtClean="0"/>
-              <a:t>11/28/2022</a:t>
+              <a:t>11/30/2022</a:t>
             </a:fld>
             <a:endParaRPr lang="en-US"/>
           </a:p>
@@ -4214,7 +4214,7 @@
           <a:p>
             <a:fld id="{64F0E216-BA48-4F04-AC4F-645AA0DD6AC6}" type="datetimeFigureOut">
               <a:rPr lang="en-US" smtClean="0"/>
-              <a:t>11/28/2022</a:t>
+              <a:t>11/30/2022</a:t>
             </a:fld>
             <a:endParaRPr lang="en-US"/>
           </a:p>
@@ -4351,7 +4351,7 @@
           <a:p>
             <a:fld id="{64F0E216-BA48-4F04-AC4F-645AA0DD6AC6}" type="datetimeFigureOut">
               <a:rPr lang="en-US" smtClean="0"/>
-              <a:t>11/28/2022</a:t>
+              <a:t>11/30/2022</a:t>
             </a:fld>
             <a:endParaRPr lang="en-US"/>
           </a:p>
@@ -4701,7 +4701,7 @@
           <a:p>
             <a:fld id="{64F0E216-BA48-4F04-AC4F-645AA0DD6AC6}" type="datetimeFigureOut">
               <a:rPr lang="en-US" smtClean="0"/>
-              <a:t>11/28/2022</a:t>
+              <a:t>11/30/2022</a:t>
             </a:fld>
             <a:endParaRPr lang="en-US"/>
           </a:p>
@@ -5022,7 +5022,7 @@
           <a:p>
             <a:fld id="{64F0E216-BA48-4F04-AC4F-645AA0DD6AC6}" type="datetimeFigureOut">
               <a:rPr lang="en-US" smtClean="0"/>
-              <a:t>11/28/2022</a:t>
+              <a:t>11/30/2022</a:t>
             </a:fld>
             <a:endParaRPr lang="en-US"/>
           </a:p>
@@ -5284,7 +5284,7 @@
             <a:fld id="{64F0E216-BA48-4F04-AC4F-645AA0DD6AC6}" type="datetimeFigureOut">
               <a:rPr lang="en-US" smtClean="0"/>
               <a:pPr/>
-              <a:t>11/28/2022</a:t>
+              <a:t>11/30/2022</a:t>
             </a:fld>
             <a:endParaRPr lang="en-US" dirty="0"/>
           </a:p>
@@ -8356,76 +8356,6 @@
           </a:p>
         </p:txBody>
       </p:sp>
-      <p:pic>
-        <p:nvPicPr>
-          <p:cNvPr id="9" name="Segnaposto contenuto 8">
-            <a:extLst>
-              <a:ext uri="{FF2B5EF4-FFF2-40B4-BE49-F238E27FC236}">
-                <a16:creationId xmlns:a16="http://schemas.microsoft.com/office/drawing/2014/main" id="{9C385E2D-322A-E546-5775-781E787CB1AD}"/>
-              </a:ext>
-            </a:extLst>
-          </p:cNvPr>
-          <p:cNvPicPr>
-            <a:picLocks noGrp="1" noChangeAspect="1"/>
-          </p:cNvPicPr>
-          <p:nvPr>
-            <p:ph sz="half" idx="1"/>
-          </p:nvPr>
-        </p:nvPicPr>
-        <p:blipFill>
-          <a:blip r:embed="rId2">
-            <a:extLst>
-              <a:ext uri="{28A0092B-C50C-407E-A947-70E740481C1C}">
-                <a14:useLocalDpi xmlns:a14="http://schemas.microsoft.com/office/drawing/2010/main" val="0"/>
-              </a:ext>
-            </a:extLst>
-          </a:blip>
-          <a:stretch>
-            <a:fillRect/>
-          </a:stretch>
-        </p:blipFill>
-        <p:spPr>
-          <a:xfrm>
-            <a:off x="-3833623" y="843230"/>
-            <a:ext cx="13553695" cy="6089656"/>
-          </a:xfrm>
-        </p:spPr>
-      </p:pic>
-      <p:pic>
-        <p:nvPicPr>
-          <p:cNvPr id="11" name="Segnaposto contenuto 10">
-            <a:extLst>
-              <a:ext uri="{FF2B5EF4-FFF2-40B4-BE49-F238E27FC236}">
-                <a16:creationId xmlns:a16="http://schemas.microsoft.com/office/drawing/2014/main" id="{6865454E-CD71-A089-6EC3-6942C656242E}"/>
-              </a:ext>
-            </a:extLst>
-          </p:cNvPr>
-          <p:cNvPicPr>
-            <a:picLocks noGrp="1" noChangeAspect="1"/>
-          </p:cNvPicPr>
-          <p:nvPr>
-            <p:ph sz="half" idx="2"/>
-          </p:nvPr>
-        </p:nvPicPr>
-        <p:blipFill>
-          <a:blip r:embed="rId3">
-            <a:extLst>
-              <a:ext uri="{28A0092B-C50C-407E-A947-70E740481C1C}">
-                <a14:useLocalDpi xmlns:a14="http://schemas.microsoft.com/office/drawing/2010/main" val="0"/>
-              </a:ext>
-            </a:extLst>
-          </a:blip>
-          <a:stretch>
-            <a:fillRect/>
-          </a:stretch>
-        </p:blipFill>
-        <p:spPr>
-          <a:xfrm>
-            <a:off x="1828236" y="1284327"/>
-            <a:ext cx="12811309" cy="5756103"/>
-          </a:xfrm>
-        </p:spPr>
-      </p:pic>
       <p:sp>
         <p:nvSpPr>
           <p:cNvPr id="12" name="CasellaDiTesto 11">
@@ -8541,19 +8471,19 @@
             <a:pPr algn="ctr"/>
             <a:r>
               <a:rPr lang="it-IT" dirty="0">
-                <a:hlinkClick r:id="rId4" action="ppaction://hlinkfile"/>
+                <a:hlinkClick r:id="rId2" action="ppaction://hlinkfile"/>
               </a:rPr>
               <a:t>Attori italiani, </a:t>
             </a:r>
             <a:r>
               <a:rPr lang="it-IT" dirty="0" err="1">
-                <a:hlinkClick r:id="rId4" action="ppaction://hlinkfile"/>
+                <a:hlinkClick r:id="rId2" action="ppaction://hlinkfile"/>
               </a:rPr>
               <a:t>depth</a:t>
             </a:r>
             <a:r>
               <a:rPr lang="it-IT" dirty="0">
-                <a:hlinkClick r:id="rId4" action="ppaction://hlinkfile"/>
+                <a:hlinkClick r:id="rId2" action="ppaction://hlinkfile"/>
               </a:rPr>
               <a:t> 2</a:t>
             </a:r>
@@ -8592,19 +8522,19 @@
             <a:pPr algn="ctr"/>
             <a:r>
               <a:rPr lang="it-IT" dirty="0">
-                <a:hlinkClick r:id="rId5" action="ppaction://hlinkfile"/>
+                <a:hlinkClick r:id="rId3" action="ppaction://hlinkfile"/>
               </a:rPr>
               <a:t>Attori italiani, </a:t>
             </a:r>
             <a:r>
               <a:rPr lang="it-IT" dirty="0" err="1">
-                <a:hlinkClick r:id="rId5" action="ppaction://hlinkfile"/>
+                <a:hlinkClick r:id="rId3" action="ppaction://hlinkfile"/>
               </a:rPr>
               <a:t>depth</a:t>
             </a:r>
             <a:r>
               <a:rPr lang="it-IT" dirty="0">
-                <a:hlinkClick r:id="rId5" action="ppaction://hlinkfile"/>
+                <a:hlinkClick r:id="rId3" action="ppaction://hlinkfile"/>
               </a:rPr>
               <a:t> 3</a:t>
             </a:r>
@@ -8612,6 +8542,76 @@
           </a:p>
         </p:txBody>
       </p:sp>
+      <p:pic>
+        <p:nvPicPr>
+          <p:cNvPr id="8" name="Segnaposto contenuto 7" descr="Immagine che contiene oggetto da esterni&#10;&#10;Descrizione generata automaticamente">
+            <a:extLst>
+              <a:ext uri="{FF2B5EF4-FFF2-40B4-BE49-F238E27FC236}">
+                <a16:creationId xmlns:a16="http://schemas.microsoft.com/office/drawing/2014/main" id="{FE4FADF2-9233-C133-CF0E-4420EE1CF5B1}"/>
+              </a:ext>
+            </a:extLst>
+          </p:cNvPr>
+          <p:cNvPicPr>
+            <a:picLocks noGrp="1" noChangeAspect="1"/>
+          </p:cNvPicPr>
+          <p:nvPr>
+            <p:ph sz="half" idx="1"/>
+          </p:nvPr>
+        </p:nvPicPr>
+        <p:blipFill>
+          <a:blip r:embed="rId4">
+            <a:extLst>
+              <a:ext uri="{28A0092B-C50C-407E-A947-70E740481C1C}">
+                <a14:useLocalDpi xmlns:a14="http://schemas.microsoft.com/office/drawing/2010/main" val="0"/>
+              </a:ext>
+            </a:extLst>
+          </a:blip>
+          <a:stretch>
+            <a:fillRect/>
+          </a:stretch>
+        </p:blipFill>
+        <p:spPr>
+          <a:xfrm>
+            <a:off x="-2416731" y="1470257"/>
+            <a:ext cx="11152743" cy="5010912"/>
+          </a:xfrm>
+        </p:spPr>
+      </p:pic>
+      <p:pic>
+        <p:nvPicPr>
+          <p:cNvPr id="16" name="Segnaposto contenuto 15" descr="Immagine che contiene scuro, oggetto da esterni, illuminato, ragnatela&#10;&#10;Descrizione generata automaticamente">
+            <a:extLst>
+              <a:ext uri="{FF2B5EF4-FFF2-40B4-BE49-F238E27FC236}">
+                <a16:creationId xmlns:a16="http://schemas.microsoft.com/office/drawing/2014/main" id="{B275CE67-7F67-368C-9012-8B831A62BD7A}"/>
+              </a:ext>
+            </a:extLst>
+          </p:cNvPr>
+          <p:cNvPicPr>
+            <a:picLocks noGrp="1" noChangeAspect="1"/>
+          </p:cNvPicPr>
+          <p:nvPr>
+            <p:ph sz="half" idx="2"/>
+          </p:nvPr>
+        </p:nvPicPr>
+        <p:blipFill>
+          <a:blip r:embed="rId5">
+            <a:extLst>
+              <a:ext uri="{28A0092B-C50C-407E-A947-70E740481C1C}">
+                <a14:useLocalDpi xmlns:a14="http://schemas.microsoft.com/office/drawing/2010/main" val="0"/>
+              </a:ext>
+            </a:extLst>
+          </a:blip>
+          <a:stretch>
+            <a:fillRect/>
+          </a:stretch>
+        </p:blipFill>
+        <p:spPr>
+          <a:xfrm>
+            <a:off x="3264408" y="1627598"/>
+            <a:ext cx="10647999" cy="4784132"/>
+          </a:xfrm>
+        </p:spPr>
+      </p:pic>
     </p:spTree>
     <p:extLst>
       <p:ext uri="{BB962C8B-B14F-4D97-AF65-F5344CB8AC3E}">
@@ -8676,76 +8676,6 @@
           </a:p>
         </p:txBody>
       </p:sp>
-      <p:pic>
-        <p:nvPicPr>
-          <p:cNvPr id="6" name="Segnaposto contenuto 5">
-            <a:extLst>
-              <a:ext uri="{FF2B5EF4-FFF2-40B4-BE49-F238E27FC236}">
-                <a16:creationId xmlns:a16="http://schemas.microsoft.com/office/drawing/2014/main" id="{0781193C-0A1E-3E81-6F9D-400723374D91}"/>
-              </a:ext>
-            </a:extLst>
-          </p:cNvPr>
-          <p:cNvPicPr>
-            <a:picLocks noGrp="1" noChangeAspect="1"/>
-          </p:cNvPicPr>
-          <p:nvPr>
-            <p:ph sz="half" idx="1"/>
-          </p:nvPr>
-        </p:nvPicPr>
-        <p:blipFill>
-          <a:blip r:embed="rId2">
-            <a:extLst>
-              <a:ext uri="{28A0092B-C50C-407E-A947-70E740481C1C}">
-                <a14:useLocalDpi xmlns:a14="http://schemas.microsoft.com/office/drawing/2010/main" val="0"/>
-              </a:ext>
-            </a:extLst>
-          </a:blip>
-          <a:stretch>
-            <a:fillRect/>
-          </a:stretch>
-        </p:blipFill>
-        <p:spPr>
-          <a:xfrm>
-            <a:off x="-3237625" y="1570632"/>
-            <a:ext cx="11130548" cy="5000940"/>
-          </a:xfrm>
-        </p:spPr>
-      </p:pic>
-      <p:pic>
-        <p:nvPicPr>
-          <p:cNvPr id="8" name="Segnaposto contenuto 7">
-            <a:extLst>
-              <a:ext uri="{FF2B5EF4-FFF2-40B4-BE49-F238E27FC236}">
-                <a16:creationId xmlns:a16="http://schemas.microsoft.com/office/drawing/2014/main" id="{978572F5-13F1-0C64-585C-58993AE78265}"/>
-              </a:ext>
-            </a:extLst>
-          </p:cNvPr>
-          <p:cNvPicPr>
-            <a:picLocks noGrp="1" noChangeAspect="1"/>
-          </p:cNvPicPr>
-          <p:nvPr>
-            <p:ph sz="half" idx="2"/>
-          </p:nvPr>
-        </p:nvPicPr>
-        <p:blipFill>
-          <a:blip r:embed="rId3">
-            <a:extLst>
-              <a:ext uri="{28A0092B-C50C-407E-A947-70E740481C1C}">
-                <a14:useLocalDpi xmlns:a14="http://schemas.microsoft.com/office/drawing/2010/main" val="0"/>
-              </a:ext>
-            </a:extLst>
-          </a:blip>
-          <a:stretch>
-            <a:fillRect/>
-          </a:stretch>
-        </p:blipFill>
-        <p:spPr>
-          <a:xfrm>
-            <a:off x="1728217" y="1570632"/>
-            <a:ext cx="10776966" cy="4842076"/>
-          </a:xfrm>
-        </p:spPr>
-      </p:pic>
       <p:sp>
         <p:nvSpPr>
           <p:cNvPr id="9" name="CasellaDiTesto 8">
@@ -8842,7 +8772,7 @@
         </p:nvSpPr>
         <p:spPr>
           <a:xfrm>
-            <a:off x="1444752" y="6236208"/>
+            <a:off x="1338451" y="6236208"/>
             <a:ext cx="3337560" cy="369332"/>
           </a:xfrm>
           <a:prstGeom prst="rect">
@@ -8859,19 +8789,19 @@
             <a:pPr algn="ctr"/>
             <a:r>
               <a:rPr lang="it-IT" dirty="0">
-                <a:hlinkClick r:id="rId4" action="ppaction://hlinkfile"/>
+                <a:hlinkClick r:id="rId2" action="ppaction://hlinkfile"/>
               </a:rPr>
               <a:t>Attori non italiani, </a:t>
             </a:r>
             <a:r>
               <a:rPr lang="it-IT" dirty="0" err="1">
-                <a:hlinkClick r:id="rId4" action="ppaction://hlinkfile"/>
+                <a:hlinkClick r:id="rId2" action="ppaction://hlinkfile"/>
               </a:rPr>
               <a:t>depth</a:t>
             </a:r>
             <a:r>
               <a:rPr lang="it-IT" dirty="0">
-                <a:hlinkClick r:id="rId4" action="ppaction://hlinkfile"/>
+                <a:hlinkClick r:id="rId2" action="ppaction://hlinkfile"/>
               </a:rPr>
               <a:t> 2</a:t>
             </a:r>
@@ -8893,7 +8823,7 @@
         </p:nvSpPr>
         <p:spPr>
           <a:xfrm>
-            <a:off x="7299960" y="6236208"/>
+            <a:off x="7195331" y="6228400"/>
             <a:ext cx="3447288" cy="369332"/>
           </a:xfrm>
           <a:prstGeom prst="rect">
@@ -8910,19 +8840,19 @@
             <a:pPr algn="ctr"/>
             <a:r>
               <a:rPr lang="it-IT" dirty="0">
-                <a:hlinkClick r:id="rId5" action="ppaction://hlinkfile"/>
+                <a:hlinkClick r:id="rId3" action="ppaction://hlinkfile"/>
               </a:rPr>
               <a:t>Attori non italiani, </a:t>
             </a:r>
             <a:r>
               <a:rPr lang="it-IT" dirty="0" err="1">
-                <a:hlinkClick r:id="rId5" action="ppaction://hlinkfile"/>
+                <a:hlinkClick r:id="rId3" action="ppaction://hlinkfile"/>
               </a:rPr>
               <a:t>depth</a:t>
             </a:r>
             <a:r>
               <a:rPr lang="it-IT" dirty="0">
-                <a:hlinkClick r:id="rId5" action="ppaction://hlinkfile"/>
+                <a:hlinkClick r:id="rId3" action="ppaction://hlinkfile"/>
               </a:rPr>
               <a:t> 3</a:t>
             </a:r>
@@ -8930,6 +8860,76 @@
           </a:p>
         </p:txBody>
       </p:sp>
+      <p:pic>
+        <p:nvPicPr>
+          <p:cNvPr id="14" name="Segnaposto contenuto 13" descr="Immagine che contiene scuro, cielo notturno&#10;&#10;Descrizione generata automaticamente">
+            <a:extLst>
+              <a:ext uri="{FF2B5EF4-FFF2-40B4-BE49-F238E27FC236}">
+                <a16:creationId xmlns:a16="http://schemas.microsoft.com/office/drawing/2014/main" id="{36C9FF49-262A-DDAB-89A8-5E9173A7BA53}"/>
+              </a:ext>
+            </a:extLst>
+          </p:cNvPr>
+          <p:cNvPicPr>
+            <a:picLocks noGrp="1" noChangeAspect="1"/>
+          </p:cNvPicPr>
+          <p:nvPr>
+            <p:ph sz="half" idx="1"/>
+          </p:nvPr>
+        </p:nvPicPr>
+        <p:blipFill>
+          <a:blip r:embed="rId4">
+            <a:extLst>
+              <a:ext uri="{28A0092B-C50C-407E-A947-70E740481C1C}">
+                <a14:useLocalDpi xmlns:a14="http://schemas.microsoft.com/office/drawing/2010/main" val="0"/>
+              </a:ext>
+            </a:extLst>
+          </a:blip>
+          <a:stretch>
+            <a:fillRect/>
+          </a:stretch>
+        </p:blipFill>
+        <p:spPr>
+          <a:xfrm>
+            <a:off x="-2540522" y="1554049"/>
+            <a:ext cx="10807347" cy="4855725"/>
+          </a:xfrm>
+        </p:spPr>
+      </p:pic>
+      <p:pic>
+        <p:nvPicPr>
+          <p:cNvPr id="16" name="Segnaposto contenuto 15" descr="Immagine che contiene scuro, notte, cielo notturno&#10;&#10;Descrizione generata automaticamente">
+            <a:extLst>
+              <a:ext uri="{FF2B5EF4-FFF2-40B4-BE49-F238E27FC236}">
+                <a16:creationId xmlns:a16="http://schemas.microsoft.com/office/drawing/2014/main" id="{9964C10D-AAC9-E48C-CFB0-469012E9F46D}"/>
+              </a:ext>
+            </a:extLst>
+          </p:cNvPr>
+          <p:cNvPicPr>
+            <a:picLocks noGrp="1" noChangeAspect="1"/>
+          </p:cNvPicPr>
+          <p:nvPr>
+            <p:ph sz="half" idx="2"/>
+          </p:nvPr>
+        </p:nvPicPr>
+        <p:blipFill>
+          <a:blip r:embed="rId5">
+            <a:extLst>
+              <a:ext uri="{28A0092B-C50C-407E-A947-70E740481C1C}">
+                <a14:useLocalDpi xmlns:a14="http://schemas.microsoft.com/office/drawing/2010/main" val="0"/>
+              </a:ext>
+            </a:extLst>
+          </a:blip>
+          <a:stretch>
+            <a:fillRect/>
+          </a:stretch>
+        </p:blipFill>
+        <p:spPr>
+          <a:xfrm>
+            <a:off x="3168974" y="1377191"/>
+            <a:ext cx="11225682" cy="5043683"/>
+          </a:xfrm>
+        </p:spPr>
+      </p:pic>
     </p:spTree>
     <p:extLst>
       <p:ext uri="{BB962C8B-B14F-4D97-AF65-F5344CB8AC3E}">

</xml_diff>

<commit_message>
fixed wrong links in presentation
</commit_message>
<xml_diff>
--- a/presentazione_davide_carniselli.pptx
+++ b/presentazione_davide_carniselli.pptx
@@ -8934,7 +8934,7 @@
             <a:fld id="{64F0E216-BA48-4F04-AC4F-645AA0DD6AC6}" type="datetimeFigureOut">
               <a:rPr lang="en-US" smtClean="0"/>
               <a:pPr/>
-              <a:t>12/12/2022</a:t>
+              <a:t>8/13/2023</a:t>
             </a:fld>
             <a:endParaRPr lang="en-US" dirty="0"/>
           </a:p>
@@ -9143,7 +9143,7 @@
             <a:fld id="{64F0E216-BA48-4F04-AC4F-645AA0DD6AC6}" type="datetimeFigureOut">
               <a:rPr lang="en-US" smtClean="0"/>
               <a:pPr/>
-              <a:t>12/12/2022</a:t>
+              <a:t>8/13/2023</a:t>
             </a:fld>
             <a:endParaRPr lang="en-US" dirty="0"/>
           </a:p>
@@ -9325,7 +9325,7 @@
             <a:fld id="{64F0E216-BA48-4F04-AC4F-645AA0DD6AC6}" type="datetimeFigureOut">
               <a:rPr lang="en-US" smtClean="0"/>
               <a:pPr/>
-              <a:t>12/12/2022</a:t>
+              <a:t>8/13/2023</a:t>
             </a:fld>
             <a:endParaRPr lang="en-US" dirty="0"/>
           </a:p>
@@ -9532,7 +9532,7 @@
             <a:fld id="{64F0E216-BA48-4F04-AC4F-645AA0DD6AC6}" type="datetimeFigureOut">
               <a:rPr lang="en-US" smtClean="0"/>
               <a:pPr/>
-              <a:t>12/12/2022</a:t>
+              <a:t>8/13/2023</a:t>
             </a:fld>
             <a:endParaRPr lang="en-US" dirty="0"/>
           </a:p>
@@ -18432,7 +18432,7 @@
             <a:fld id="{64F0E216-BA48-4F04-AC4F-645AA0DD6AC6}" type="datetimeFigureOut">
               <a:rPr lang="en-US" smtClean="0"/>
               <a:pPr/>
-              <a:t>12/12/2022</a:t>
+              <a:t>8/13/2023</a:t>
             </a:fld>
             <a:endParaRPr lang="en-US" dirty="0"/>
           </a:p>
@@ -18708,7 +18708,7 @@
             <a:fld id="{64F0E216-BA48-4F04-AC4F-645AA0DD6AC6}" type="datetimeFigureOut">
               <a:rPr lang="en-US" smtClean="0"/>
               <a:pPr/>
-              <a:t>12/12/2022</a:t>
+              <a:t>8/13/2023</a:t>
             </a:fld>
             <a:endParaRPr lang="en-US" dirty="0"/>
           </a:p>
@@ -19108,7 +19108,7 @@
             <a:fld id="{64F0E216-BA48-4F04-AC4F-645AA0DD6AC6}" type="datetimeFigureOut">
               <a:rPr lang="en-US" smtClean="0"/>
               <a:pPr/>
-              <a:t>12/12/2022</a:t>
+              <a:t>8/13/2023</a:t>
             </a:fld>
             <a:endParaRPr lang="en-US" dirty="0"/>
           </a:p>
@@ -19228,7 +19228,7 @@
             <a:fld id="{64F0E216-BA48-4F04-AC4F-645AA0DD6AC6}" type="datetimeFigureOut">
               <a:rPr lang="en-US" smtClean="0"/>
               <a:pPr/>
-              <a:t>12/12/2022</a:t>
+              <a:t>8/13/2023</a:t>
             </a:fld>
             <a:endParaRPr lang="en-US" dirty="0"/>
           </a:p>
@@ -19325,7 +19325,7 @@
             <a:fld id="{64F0E216-BA48-4F04-AC4F-645AA0DD6AC6}" type="datetimeFigureOut">
               <a:rPr lang="en-US" smtClean="0"/>
               <a:pPr/>
-              <a:t>12/12/2022</a:t>
+              <a:t>8/13/2023</a:t>
             </a:fld>
             <a:endParaRPr lang="en-US" dirty="0"/>
           </a:p>
@@ -19617,7 +19617,7 @@
             <a:fld id="{64F0E216-BA48-4F04-AC4F-645AA0DD6AC6}" type="datetimeFigureOut">
               <a:rPr lang="en-US" smtClean="0"/>
               <a:pPr/>
-              <a:t>12/12/2022</a:t>
+              <a:t>8/13/2023</a:t>
             </a:fld>
             <a:endParaRPr lang="en-US" dirty="0"/>
           </a:p>
@@ -19899,7 +19899,7 @@
             <a:fld id="{64F0E216-BA48-4F04-AC4F-645AA0DD6AC6}" type="datetimeFigureOut">
               <a:rPr lang="en-US" smtClean="0"/>
               <a:pPr/>
-              <a:t>12/12/2022</a:t>
+              <a:t>8/13/2023</a:t>
             </a:fld>
             <a:endParaRPr lang="en-US" dirty="0"/>
           </a:p>
@@ -20151,7 +20151,7 @@
             <a:fld id="{64F0E216-BA48-4F04-AC4F-645AA0DD6AC6}" type="datetimeFigureOut">
               <a:rPr lang="en-US" smtClean="0"/>
               <a:pPr/>
-              <a:t>12/12/2022</a:t>
+              <a:t>8/13/2023</a:t>
             </a:fld>
             <a:endParaRPr lang="en-US" dirty="0"/>
           </a:p>

</xml_diff>